<commit_message>
Add *.csv Save function
</commit_message>
<xml_diff>
--- a/Teach.pptx
+++ b/Teach.pptx
@@ -3522,7 +3522,7 @@
         </p:blipFill>
         <p:spPr>
           <a:xfrm>
-            <a:off x="8418013" y="4076975"/>
+            <a:off x="8317619" y="4076975"/>
             <a:ext cx="2676455" cy="2676455"/>
           </a:xfrm>
           <a:prstGeom prst="rect">
@@ -3620,8 +3620,8 @@
         </p:blipFill>
         <p:spPr>
           <a:xfrm>
-            <a:off x="7797715" y="216551"/>
-            <a:ext cx="3657209" cy="1828605"/>
+            <a:off x="7715795" y="263710"/>
+            <a:ext cx="3880105" cy="1940053"/>
           </a:xfrm>
           <a:prstGeom prst="rect">
             <a:avLst/>
@@ -4034,30 +4034,17 @@
             </a:r>
             <a:r>
               <a:rPr lang="en-US" altLang="zh-TW" sz="2000" dirty="0"/>
-              <a:t> are produced by two different unit engineers</a:t>
-            </a:r>
-            <a:r>
-              <a:rPr lang="en-US" altLang="zh-TW" sz="2000" dirty="0" smtClean="0"/>
-              <a:t>.</a:t>
-            </a:r>
-          </a:p>
-          <a:p>
-            <a:endParaRPr lang="en-US" altLang="zh-TW" sz="2000" dirty="0" smtClean="0"/>
+              <a:t> are produced by two different unit engineers.</a:t>
+            </a:r>
+          </a:p>
+          <a:p>
+            <a:endParaRPr lang="en-US" altLang="zh-TW" sz="2000" dirty="0"/>
           </a:p>
           <a:p>
             <a:r>
               <a:rPr lang="en-US" altLang="zh-TW" sz="2000" dirty="0"/>
-              <a:t>Therefore, Intent </a:t>
-            </a:r>
-            <a:r>
-              <a:rPr lang="en-US" altLang="zh-TW" sz="2000" dirty="0" smtClean="0"/>
-              <a:t>method </a:t>
-            </a:r>
-            <a:r>
-              <a:rPr lang="en-US" altLang="zh-TW" sz="2000" dirty="0"/>
-              <a:t>is needed to call the other party's APP and transmit messages.</a:t>
-            </a:r>
-            <a:endParaRPr lang="en-US" altLang="zh-TW" sz="2000" dirty="0"/>
+              <a:t>Therefore, Intent method is needed to call the other party's APP and transmit messages.</a:t>
+            </a:r>
           </a:p>
         </p:txBody>
       </p:sp>
@@ -4243,15 +4230,7 @@
                   <a:srgbClr val="FF0000"/>
                 </a:solidFill>
               </a:rPr>
-              <a:t>APP1—</a:t>
-            </a:r>
-            <a:r>
-              <a:rPr lang="en-US" altLang="zh-TW" dirty="0" err="1">
-                <a:solidFill>
-                  <a:srgbClr val="FF0000"/>
-                </a:solidFill>
-              </a:rPr>
-              <a:t>MainActivity</a:t>
+              <a:t>APP1—Activity1</a:t>
             </a:r>
             <a:endParaRPr lang="zh-TW" altLang="en-US" dirty="0">
               <a:solidFill>
@@ -4276,7 +4255,7 @@
         <p:spPr>
           <a:xfrm>
             <a:off x="3149600" y="786633"/>
-            <a:ext cx="3494750" cy="369332"/>
+            <a:ext cx="2946400" cy="369332"/>
           </a:xfrm>
           <a:prstGeom prst="rect">
             <a:avLst/>
@@ -4697,12 +4676,8 @@
           <a:lstStyle/>
           <a:p>
             <a:r>
-              <a:rPr lang="en-US" altLang="zh-TW" dirty="0" smtClean="0"/>
-              <a:t>Reference </a:t>
-            </a:r>
-            <a:r>
               <a:rPr lang="en-US" altLang="zh-TW" dirty="0"/>
-              <a:t>from AI</a:t>
+              <a:t>Reference from AI</a:t>
             </a:r>
             <a:endParaRPr lang="zh-TW" altLang="en-US" dirty="0"/>
           </a:p>
@@ -4738,56 +4713,12 @@
           <a:chExt cx="0" cy="0"/>
         </a:xfrm>
       </p:grpSpPr>
-      <p:sp>
-        <p:nvSpPr>
-          <p:cNvPr id="2" name="標題 1">
-            <a:extLst>
-              <a:ext uri="{FF2B5EF4-FFF2-40B4-BE49-F238E27FC236}">
-                <a16:creationId xmlns:a16="http://schemas.microsoft.com/office/drawing/2014/main" id="{8097AD09-7E5F-4C90-999F-B344884E6094}"/>
-              </a:ext>
-            </a:extLst>
-          </p:cNvPr>
-          <p:cNvSpPr>
-            <a:spLocks noGrp="1"/>
-          </p:cNvSpPr>
-          <p:nvPr>
-            <p:ph type="title"/>
-          </p:nvPr>
-        </p:nvSpPr>
-        <p:spPr>
-          <a:xfrm>
-            <a:off x="-1" y="0"/>
-            <a:ext cx="8862061" cy="922867"/>
-          </a:xfrm>
-        </p:spPr>
-        <p:txBody>
-          <a:bodyPr>
-            <a:normAutofit/>
-          </a:bodyPr>
-          <a:lstStyle/>
-          <a:p>
-            <a:r>
-              <a:rPr lang="en-US" altLang="zh-TW" dirty="0"/>
-              <a:t>Rd545cmd1—Rd545 </a:t>
-            </a:r>
-            <a:r>
-              <a:rPr lang="en-US" altLang="zh-TW" dirty="0" err="1"/>
-              <a:t>Api</a:t>
-            </a:r>
-            <a:r>
-              <a:rPr lang="en-US" altLang="zh-TW" dirty="0"/>
-              <a:t> call Example</a:t>
-            </a:r>
-            <a:endParaRPr lang="zh-TW" altLang="en-US" dirty="0"/>
-          </a:p>
-        </p:txBody>
-      </p:sp>
       <p:pic>
         <p:nvPicPr>
-          <p:cNvPr id="40" name="圖片 39">
-            <a:extLst>
-              <a:ext uri="{FF2B5EF4-FFF2-40B4-BE49-F238E27FC236}">
-                <a16:creationId xmlns:a16="http://schemas.microsoft.com/office/drawing/2014/main" id="{33F52219-01B5-4E78-9C84-9B6FE4A26D74}"/>
+          <p:cNvPr id="4" name="圖片 3">
+            <a:extLst>
+              <a:ext uri="{FF2B5EF4-FFF2-40B4-BE49-F238E27FC236}">
+                <a16:creationId xmlns:a16="http://schemas.microsoft.com/office/drawing/2014/main" id="{DA3854EB-49E8-4D13-8094-E207058332ED}"/>
               </a:ext>
             </a:extLst>
           </p:cNvPr>
@@ -4804,88 +4735,23 @@
         </p:blipFill>
         <p:spPr>
           <a:xfrm>
-            <a:off x="9179766" y="1097821"/>
-            <a:ext cx="1826208" cy="1997670"/>
+            <a:off x="4679686" y="2710166"/>
+            <a:ext cx="2778079" cy="3048170"/>
           </a:xfrm>
           <a:prstGeom prst="rect">
             <a:avLst/>
           </a:prstGeom>
         </p:spPr>
       </p:pic>
-      <p:sp>
-        <p:nvSpPr>
-          <p:cNvPr id="45" name="文字方塊 44">
-            <a:extLst>
-              <a:ext uri="{FF2B5EF4-FFF2-40B4-BE49-F238E27FC236}">
-                <a16:creationId xmlns:a16="http://schemas.microsoft.com/office/drawing/2014/main" id="{E49634F5-CAD1-47B7-AAB8-D604B4F7C6E8}"/>
-              </a:ext>
-            </a:extLst>
-          </p:cNvPr>
-          <p:cNvSpPr txBox="1"/>
-          <p:nvPr/>
-        </p:nvSpPr>
-        <p:spPr>
-          <a:xfrm>
-            <a:off x="6151357" y="674391"/>
-            <a:ext cx="2881955" cy="369332"/>
-          </a:xfrm>
-          <a:prstGeom prst="rect">
-            <a:avLst/>
-          </a:prstGeom>
-          <a:noFill/>
-          <a:ln>
-            <a:noFill/>
-          </a:ln>
-        </p:spPr>
-        <p:txBody>
-          <a:bodyPr wrap="square" rtlCol="0">
-            <a:spAutoFit/>
-          </a:bodyPr>
-          <a:lstStyle/>
-          <a:p>
-            <a:r>
-              <a:rPr lang="en-US" altLang="zh-TW" dirty="0">
-                <a:solidFill>
-                  <a:srgbClr val="00B050"/>
-                </a:solidFill>
-              </a:rPr>
-              <a:t>Bluetooth </a:t>
-            </a:r>
-            <a:r>
-              <a:rPr lang="en-US" altLang="zh-TW" dirty="0" smtClean="0">
-                <a:solidFill>
-                  <a:srgbClr val="00B050"/>
-                </a:solidFill>
-              </a:rPr>
-              <a:t>LE</a:t>
-            </a:r>
-            <a:r>
-              <a:rPr lang="zh-TW" altLang="en-US" dirty="0" smtClean="0">
-                <a:solidFill>
-                  <a:srgbClr val="00B050"/>
-                </a:solidFill>
-              </a:rPr>
-              <a:t> </a:t>
-            </a:r>
-            <a:r>
-              <a:rPr lang="en-US" altLang="zh-TW" dirty="0" smtClean="0">
-                <a:solidFill>
-                  <a:srgbClr val="00B050"/>
-                </a:solidFill>
-              </a:rPr>
-              <a:t>Control Test</a:t>
-            </a:r>
-            <a:endParaRPr lang="zh-TW" altLang="en-US" dirty="0">
-              <a:solidFill>
-                <a:srgbClr val="00B050"/>
-              </a:solidFill>
-            </a:endParaRPr>
-          </a:p>
-        </p:txBody>
-      </p:sp>
       <p:pic>
         <p:nvPicPr>
-          <p:cNvPr id="5" name="圖片 4"/>
+          <p:cNvPr id="9" name="圖片 8">
+            <a:extLst>
+              <a:ext uri="{FF2B5EF4-FFF2-40B4-BE49-F238E27FC236}">
+                <a16:creationId xmlns:a16="http://schemas.microsoft.com/office/drawing/2014/main" id="{3AA1BB77-CE3F-46EA-A90F-28B1F542B1B2}"/>
+              </a:ext>
+            </a:extLst>
+          </p:cNvPr>
           <p:cNvPicPr>
             <a:picLocks noChangeAspect="1"/>
           </p:cNvPicPr>
@@ -4899,8 +4765,8 @@
         </p:blipFill>
         <p:spPr>
           <a:xfrm>
-            <a:off x="308558" y="1137032"/>
-            <a:ext cx="2763099" cy="2302583"/>
+            <a:off x="522428" y="1097821"/>
+            <a:ext cx="2392394" cy="2746823"/>
           </a:xfrm>
           <a:prstGeom prst="rect">
             <a:avLst/>
@@ -4909,29 +4775,43 @@
       </p:pic>
       <p:sp>
         <p:nvSpPr>
-          <p:cNvPr id="6" name="矩形 5"/>
-          <p:cNvSpPr/>
-          <p:nvPr/>
-        </p:nvSpPr>
-        <p:spPr>
-          <a:xfrm>
-            <a:off x="9277870" y="784813"/>
-            <a:ext cx="1483547" cy="369332"/>
-          </a:xfrm>
-          <a:prstGeom prst="rect">
-            <a:avLst/>
-          </a:prstGeom>
-        </p:spPr>
-        <p:txBody>
-          <a:bodyPr wrap="none">
-            <a:spAutoFit/>
+          <p:cNvPr id="2" name="標題 1">
+            <a:extLst>
+              <a:ext uri="{FF2B5EF4-FFF2-40B4-BE49-F238E27FC236}">
+                <a16:creationId xmlns:a16="http://schemas.microsoft.com/office/drawing/2014/main" id="{8097AD09-7E5F-4C90-999F-B344884E6094}"/>
+              </a:ext>
+            </a:extLst>
+          </p:cNvPr>
+          <p:cNvSpPr>
+            <a:spLocks noGrp="1"/>
+          </p:cNvSpPr>
+          <p:nvPr>
+            <p:ph type="title"/>
+          </p:nvPr>
+        </p:nvSpPr>
+        <p:spPr>
+          <a:xfrm>
+            <a:off x="-1" y="0"/>
+            <a:ext cx="8862061" cy="922867"/>
+          </a:xfrm>
+        </p:spPr>
+        <p:txBody>
+          <a:bodyPr>
+            <a:normAutofit/>
           </a:bodyPr>
           <a:lstStyle/>
           <a:p>
-            <a:pPr algn="ctr"/>
             <a:r>
               <a:rPr lang="en-US" altLang="zh-TW" dirty="0"/>
-              <a:t>RD545 Device</a:t>
+              <a:t>Rd545cmd1—Rd545 </a:t>
+            </a:r>
+            <a:r>
+              <a:rPr lang="en-US" altLang="zh-TW" dirty="0" err="1"/>
+              <a:t>Api</a:t>
+            </a:r>
+            <a:r>
+              <a:rPr lang="en-US" altLang="zh-TW" dirty="0"/>
+              <a:t> call Example</a:t>
             </a:r>
             <a:endParaRPr lang="zh-TW" altLang="en-US" dirty="0"/>
           </a:p>
@@ -4939,7 +4819,13 @@
       </p:sp>
       <p:pic>
         <p:nvPicPr>
-          <p:cNvPr id="7" name="圖片 6"/>
+          <p:cNvPr id="40" name="圖片 39">
+            <a:extLst>
+              <a:ext uri="{FF2B5EF4-FFF2-40B4-BE49-F238E27FC236}">
+                <a16:creationId xmlns:a16="http://schemas.microsoft.com/office/drawing/2014/main" id="{33F52219-01B5-4E78-9C84-9B6FE4A26D74}"/>
+              </a:ext>
+            </a:extLst>
+          </p:cNvPr>
           <p:cNvPicPr>
             <a:picLocks noChangeAspect="1"/>
           </p:cNvPicPr>
@@ -4953,8 +4839,8 @@
         </p:blipFill>
         <p:spPr>
           <a:xfrm>
-            <a:off x="4769809" y="1137032"/>
-            <a:ext cx="2763099" cy="2302583"/>
+            <a:off x="9179766" y="1097821"/>
+            <a:ext cx="1826208" cy="1997670"/>
           </a:xfrm>
           <a:prstGeom prst="rect">
             <a:avLst/>
@@ -4963,19 +4849,28 @@
       </p:pic>
       <p:sp>
         <p:nvSpPr>
-          <p:cNvPr id="10" name="文字方塊 9"/>
+          <p:cNvPr id="45" name="文字方塊 44">
+            <a:extLst>
+              <a:ext uri="{FF2B5EF4-FFF2-40B4-BE49-F238E27FC236}">
+                <a16:creationId xmlns:a16="http://schemas.microsoft.com/office/drawing/2014/main" id="{E49634F5-CAD1-47B7-AAB8-D604B4F7C6E8}"/>
+              </a:ext>
+            </a:extLst>
+          </p:cNvPr>
           <p:cNvSpPr txBox="1"/>
           <p:nvPr/>
         </p:nvSpPr>
         <p:spPr>
           <a:xfrm>
-            <a:off x="4851097" y="797540"/>
-            <a:ext cx="1014804" cy="369332"/>
+            <a:off x="6151357" y="674391"/>
+            <a:ext cx="2881955" cy="369332"/>
           </a:xfrm>
           <a:prstGeom prst="rect">
             <a:avLst/>
           </a:prstGeom>
           <a:noFill/>
+          <a:ln>
+            <a:noFill/>
+          </a:ln>
         </p:spPr>
         <p:txBody>
           <a:bodyPr wrap="square" rtlCol="0">
@@ -4984,8 +4879,62 @@
           <a:lstStyle/>
           <a:p>
             <a:r>
-              <a:rPr lang="en-US" altLang="zh-TW" dirty="0" smtClean="0"/>
-              <a:t>Activity2</a:t>
+              <a:rPr lang="en-US" altLang="zh-TW" dirty="0">
+                <a:solidFill>
+                  <a:srgbClr val="00B050"/>
+                </a:solidFill>
+              </a:rPr>
+              <a:t>Bluetooth LE</a:t>
+            </a:r>
+            <a:r>
+              <a:rPr lang="zh-TW" altLang="en-US" dirty="0">
+                <a:solidFill>
+                  <a:srgbClr val="00B050"/>
+                </a:solidFill>
+              </a:rPr>
+              <a:t> </a:t>
+            </a:r>
+            <a:r>
+              <a:rPr lang="en-US" altLang="zh-TW" dirty="0">
+                <a:solidFill>
+                  <a:srgbClr val="00B050"/>
+                </a:solidFill>
+              </a:rPr>
+              <a:t>Control Test</a:t>
+            </a:r>
+            <a:endParaRPr lang="zh-TW" altLang="en-US" dirty="0">
+              <a:solidFill>
+                <a:srgbClr val="00B050"/>
+              </a:solidFill>
+            </a:endParaRPr>
+          </a:p>
+        </p:txBody>
+      </p:sp>
+      <p:sp>
+        <p:nvSpPr>
+          <p:cNvPr id="6" name="矩形 5"/>
+          <p:cNvSpPr/>
+          <p:nvPr/>
+        </p:nvSpPr>
+        <p:spPr>
+          <a:xfrm>
+            <a:off x="9277870" y="784813"/>
+            <a:ext cx="1483547" cy="369332"/>
+          </a:xfrm>
+          <a:prstGeom prst="rect">
+            <a:avLst/>
+          </a:prstGeom>
+        </p:spPr>
+        <p:txBody>
+          <a:bodyPr wrap="none">
+            <a:spAutoFit/>
+          </a:bodyPr>
+          <a:lstStyle/>
+          <a:p>
+            <a:pPr algn="ctr"/>
+            <a:r>
+              <a:rPr lang="en-US" altLang="zh-TW" dirty="0"/>
+              <a:t>RD545 Device</a:t>
             </a:r>
             <a:endParaRPr lang="zh-TW" altLang="en-US" dirty="0"/>
           </a:p>
@@ -4993,14 +4942,14 @@
       </p:sp>
       <p:sp>
         <p:nvSpPr>
-          <p:cNvPr id="47" name="文字方塊 46"/>
+          <p:cNvPr id="10" name="文字方塊 9"/>
           <p:cNvSpPr txBox="1"/>
           <p:nvPr/>
         </p:nvSpPr>
         <p:spPr>
           <a:xfrm>
-            <a:off x="1172972" y="817599"/>
-            <a:ext cx="1036875" cy="369332"/>
+            <a:off x="4851097" y="797540"/>
+            <a:ext cx="1014804" cy="369332"/>
           </a:xfrm>
           <a:prstGeom prst="rect">
             <a:avLst/>
@@ -5014,7 +4963,37 @@
           <a:lstStyle/>
           <a:p>
             <a:r>
-              <a:rPr lang="en-US" altLang="zh-TW" dirty="0" smtClean="0"/>
+              <a:rPr lang="en-US" altLang="zh-TW" dirty="0"/>
+              <a:t>Activity2</a:t>
+            </a:r>
+            <a:endParaRPr lang="zh-TW" altLang="en-US" dirty="0"/>
+          </a:p>
+        </p:txBody>
+      </p:sp>
+      <p:sp>
+        <p:nvSpPr>
+          <p:cNvPr id="47" name="文字方塊 46"/>
+          <p:cNvSpPr txBox="1"/>
+          <p:nvPr/>
+        </p:nvSpPr>
+        <p:spPr>
+          <a:xfrm>
+            <a:off x="1200187" y="784813"/>
+            <a:ext cx="1036875" cy="369332"/>
+          </a:xfrm>
+          <a:prstGeom prst="rect">
+            <a:avLst/>
+          </a:prstGeom>
+          <a:noFill/>
+        </p:spPr>
+        <p:txBody>
+          <a:bodyPr wrap="square" rtlCol="0">
+            <a:spAutoFit/>
+          </a:bodyPr>
+          <a:lstStyle/>
+          <a:p>
+            <a:r>
+              <a:rPr lang="en-US" altLang="zh-TW" dirty="0"/>
               <a:t>Activity1</a:t>
             </a:r>
             <a:endParaRPr lang="zh-TW" altLang="en-US" dirty="0"/>
@@ -5060,43 +5039,19 @@
           </a:fontRef>
         </p:style>
       </p:cxnSp>
-      <p:pic>
-        <p:nvPicPr>
-          <p:cNvPr id="29" name="圖片 28"/>
-          <p:cNvPicPr>
-            <a:picLocks noChangeAspect="1"/>
-          </p:cNvPicPr>
-          <p:nvPr/>
-        </p:nvPicPr>
-        <p:blipFill>
-          <a:blip r:embed="rId5"/>
-          <a:stretch>
-            <a:fillRect/>
-          </a:stretch>
-        </p:blipFill>
-        <p:spPr>
-          <a:xfrm>
-            <a:off x="4775678" y="3500275"/>
-            <a:ext cx="2757230" cy="2297692"/>
-          </a:xfrm>
-          <a:prstGeom prst="rect">
-            <a:avLst/>
-          </a:prstGeom>
-        </p:spPr>
-      </p:pic>
       <p:cxnSp>
         <p:nvCxnSpPr>
           <p:cNvPr id="53" name="肘形接點 52"/>
           <p:cNvCxnSpPr>
+            <a:cxnSpLocks/>
             <a:stCxn id="40" idx="2"/>
-            <a:endCxn id="29" idx="3"/>
           </p:cNvCxnSpPr>
           <p:nvPr/>
         </p:nvCxnSpPr>
         <p:spPr>
           <a:xfrm rot="5400000">
-            <a:off x="8036074" y="2592325"/>
-            <a:ext cx="1553630" cy="2559962"/>
+            <a:off x="8223962" y="2212435"/>
+            <a:ext cx="985853" cy="2751965"/>
           </a:xfrm>
           <a:prstGeom prst="bentConnector2">
             <a:avLst/>
@@ -5137,7 +5092,7 @@
         </p:nvSpPr>
         <p:spPr>
           <a:xfrm>
-            <a:off x="7658100" y="4317889"/>
+            <a:off x="7504951" y="3648974"/>
             <a:ext cx="2434770" cy="369332"/>
           </a:xfrm>
           <a:prstGeom prst="rect">
@@ -5160,15 +5115,7 @@
                   <a:srgbClr val="00B050"/>
                 </a:solidFill>
               </a:rPr>
-              <a:t>Bluetooth </a:t>
-            </a:r>
-            <a:r>
-              <a:rPr lang="en-US" altLang="zh-TW" dirty="0" smtClean="0">
-                <a:solidFill>
-                  <a:srgbClr val="00B050"/>
-                </a:solidFill>
-              </a:rPr>
-              <a:t>LE Read Data</a:t>
+              <a:t>Bluetooth LE Read Data</a:t>
             </a:r>
             <a:endParaRPr lang="zh-TW" altLang="en-US" dirty="0">
               <a:solidFill>
@@ -5192,8 +5139,8 @@
         </p:nvSpPr>
         <p:spPr>
           <a:xfrm>
-            <a:off x="8755760" y="5380961"/>
-            <a:ext cx="2675080" cy="1432703"/>
+            <a:off x="9939721" y="4130997"/>
+            <a:ext cx="2154321" cy="1432703"/>
           </a:xfrm>
           <a:prstGeom prst="cloud">
             <a:avLst/>
@@ -5246,18 +5193,19 @@
         <p:nvCxnSpPr>
           <p:cNvPr id="73" name="肘形接點 72"/>
           <p:cNvCxnSpPr>
+            <a:cxnSpLocks/>
             <a:endCxn id="72" idx="2"/>
           </p:cNvCxnSpPr>
           <p:nvPr/>
         </p:nvCxnSpPr>
         <p:spPr>
-          <a:xfrm>
-            <a:off x="6654800" y="5676900"/>
-            <a:ext cx="2109258" cy="420413"/>
+          <a:xfrm flipV="1">
+            <a:off x="7319259" y="4847349"/>
+            <a:ext cx="2627144" cy="189488"/>
           </a:xfrm>
           <a:prstGeom prst="bentConnector3">
             <a:avLst>
-              <a:gd name="adj1" fmla="val 928"/>
+              <a:gd name="adj1" fmla="val 50000"/>
             </a:avLst>
           </a:prstGeom>
           <a:ln w="38100">
@@ -5286,18 +5234,19 @@
         <p:nvCxnSpPr>
           <p:cNvPr id="64" name="肘形接點 63"/>
           <p:cNvCxnSpPr>
+            <a:cxnSpLocks/>
             <a:endCxn id="10" idx="1"/>
           </p:cNvCxnSpPr>
           <p:nvPr/>
         </p:nvCxnSpPr>
         <p:spPr>
           <a:xfrm flipV="1">
-            <a:off x="2603212" y="982206"/>
-            <a:ext cx="2247885" cy="2218723"/>
+            <a:off x="2099129" y="982206"/>
+            <a:ext cx="2751968" cy="2666768"/>
           </a:xfrm>
           <a:prstGeom prst="bentConnector3">
             <a:avLst>
-              <a:gd name="adj1" fmla="val 44068"/>
+              <a:gd name="adj1" fmla="val 50000"/>
             </a:avLst>
           </a:prstGeom>
           <a:ln w="38100">
@@ -5336,7 +5285,7 @@
         </p:nvSpPr>
         <p:spPr>
           <a:xfrm>
-            <a:off x="107546" y="3802735"/>
+            <a:off x="65082" y="4026843"/>
             <a:ext cx="4542940" cy="1015663"/>
           </a:xfrm>
           <a:prstGeom prst="rect">
@@ -5352,11 +5301,7 @@
           <a:p>
             <a:r>
               <a:rPr lang="en-US" altLang="zh-TW" sz="2000" dirty="0"/>
-              <a:t>This example has two Activities</a:t>
-            </a:r>
-            <a:r>
-              <a:rPr lang="en-US" altLang="zh-TW" sz="2000" dirty="0" smtClean="0"/>
-              <a:t>:</a:t>
+              <a:t>This example has two Activities:</a:t>
             </a:r>
           </a:p>
           <a:p>
@@ -5364,16 +5309,8 @@
               <a:buAutoNum type="arabicPeriod"/>
             </a:pPr>
             <a:r>
-              <a:rPr lang="en-US" altLang="zh-TW" sz="2000" dirty="0" smtClean="0"/>
-              <a:t>Set </a:t>
-            </a:r>
-            <a:r>
               <a:rPr lang="en-US" altLang="zh-TW" sz="2000" dirty="0"/>
-              <a:t>up user </a:t>
-            </a:r>
-            <a:r>
-              <a:rPr lang="en-US" altLang="zh-TW" sz="2000" dirty="0" smtClean="0"/>
-              <a:t>identity.</a:t>
+              <a:t>Set up user identity.</a:t>
             </a:r>
           </a:p>
           <a:p>
@@ -5381,18 +5318,9 @@
               <a:buAutoNum type="arabicPeriod"/>
             </a:pPr>
             <a:r>
-              <a:rPr lang="en-US" altLang="zh-TW" sz="2000" dirty="0" smtClean="0"/>
-              <a:t>Start test </a:t>
-            </a:r>
-            <a:r>
               <a:rPr lang="en-US" altLang="zh-TW" sz="2000" dirty="0"/>
-              <a:t>and </a:t>
-            </a:r>
-            <a:r>
-              <a:rPr lang="en-US" altLang="zh-TW" sz="2000" dirty="0" smtClean="0"/>
-              <a:t>update cloud server.</a:t>
-            </a:r>
-            <a:endParaRPr lang="en-US" altLang="zh-TW" sz="2000" dirty="0"/>
+              <a:t>Start test and update cloud server.</a:t>
+            </a:r>
           </a:p>
         </p:txBody>
       </p:sp>
@@ -5437,11 +5365,6 @@
               </a:rPr>
               <a:t>Intent </a:t>
             </a:r>
-            <a:endParaRPr lang="en-US" altLang="zh-TW" dirty="0">
-              <a:solidFill>
-                <a:srgbClr val="FFC000"/>
-              </a:solidFill>
-            </a:endParaRPr>
           </a:p>
         </p:txBody>
       </p:sp>
@@ -5459,7 +5382,7 @@
         </p:nvSpPr>
         <p:spPr>
           <a:xfrm>
-            <a:off x="6364067" y="6108140"/>
+            <a:off x="7467860" y="4478017"/>
             <a:ext cx="2511418" cy="369332"/>
           </a:xfrm>
           <a:prstGeom prst="rect">
@@ -5515,13 +5438,192 @@
           <a:lstStyle/>
           <a:p>
             <a:r>
-              <a:rPr lang="en-US" altLang="zh-TW" dirty="0" smtClean="0"/>
+              <a:rPr lang="en-US" altLang="zh-TW" dirty="0"/>
               <a:t>Reference from TANITA API</a:t>
             </a:r>
             <a:endParaRPr lang="zh-TW" altLang="en-US" dirty="0"/>
           </a:p>
         </p:txBody>
       </p:sp>
+      <p:pic>
+        <p:nvPicPr>
+          <p:cNvPr id="16" name="圖片 15">
+            <a:extLst>
+              <a:ext uri="{FF2B5EF4-FFF2-40B4-BE49-F238E27FC236}">
+                <a16:creationId xmlns:a16="http://schemas.microsoft.com/office/drawing/2014/main" id="{8BB45227-2EEA-428A-A171-14DA06BA070A}"/>
+              </a:ext>
+            </a:extLst>
+          </p:cNvPr>
+          <p:cNvPicPr>
+            <a:picLocks noChangeAspect="1"/>
+          </p:cNvPicPr>
+          <p:nvPr/>
+        </p:nvPicPr>
+        <p:blipFill>
+          <a:blip r:embed="rId5"/>
+          <a:stretch>
+            <a:fillRect/>
+          </a:stretch>
+        </p:blipFill>
+        <p:spPr>
+          <a:xfrm>
+            <a:off x="4679686" y="1154145"/>
+            <a:ext cx="2778079" cy="1494503"/>
+          </a:xfrm>
+          <a:prstGeom prst="rect">
+            <a:avLst/>
+          </a:prstGeom>
+        </p:spPr>
+      </p:pic>
+      <p:sp>
+        <p:nvSpPr>
+          <p:cNvPr id="37" name="矩形: 摺角紙張 36">
+            <a:extLst>
+              <a:ext uri="{FF2B5EF4-FFF2-40B4-BE49-F238E27FC236}">
+                <a16:creationId xmlns:a16="http://schemas.microsoft.com/office/drawing/2014/main" id="{6CEF6EB6-2F27-4CC2-8AB4-39C554A8C349}"/>
+              </a:ext>
+            </a:extLst>
+          </p:cNvPr>
+          <p:cNvSpPr/>
+          <p:nvPr/>
+        </p:nvSpPr>
+        <p:spPr>
+          <a:xfrm rot="10800000">
+            <a:off x="7611222" y="5685156"/>
+            <a:ext cx="614872" cy="895911"/>
+          </a:xfrm>
+          <a:prstGeom prst="foldedCorner">
+            <a:avLst>
+              <a:gd name="adj" fmla="val 25070"/>
+            </a:avLst>
+          </a:prstGeom>
+          <a:noFill/>
+          <a:ln>
+            <a:solidFill>
+              <a:schemeClr val="accent1">
+                <a:lumMod val="75000"/>
+              </a:schemeClr>
+            </a:solidFill>
+          </a:ln>
+        </p:spPr>
+        <p:style>
+          <a:lnRef idx="2">
+            <a:schemeClr val="accent1">
+              <a:shade val="50000"/>
+            </a:schemeClr>
+          </a:lnRef>
+          <a:fillRef idx="1">
+            <a:schemeClr val="accent1"/>
+          </a:fillRef>
+          <a:effectRef idx="0">
+            <a:schemeClr val="accent1"/>
+          </a:effectRef>
+          <a:fontRef idx="minor">
+            <a:schemeClr val="lt1"/>
+          </a:fontRef>
+        </p:style>
+        <p:txBody>
+          <a:bodyPr rtlCol="0" anchor="ctr"/>
+          <a:lstStyle/>
+          <a:p>
+            <a:pPr algn="ctr"/>
+            <a:endParaRPr lang="zh-TW" altLang="en-US" dirty="0">
+              <a:solidFill>
+                <a:srgbClr val="00B0F0"/>
+              </a:solidFill>
+            </a:endParaRPr>
+          </a:p>
+        </p:txBody>
+      </p:sp>
+      <p:sp>
+        <p:nvSpPr>
+          <p:cNvPr id="38" name="文字方塊 37">
+            <a:extLst>
+              <a:ext uri="{FF2B5EF4-FFF2-40B4-BE49-F238E27FC236}">
+                <a16:creationId xmlns:a16="http://schemas.microsoft.com/office/drawing/2014/main" id="{B6CCEE2B-BF4C-4B42-B8B3-BEC1F7661D28}"/>
+              </a:ext>
+            </a:extLst>
+          </p:cNvPr>
+          <p:cNvSpPr txBox="1"/>
+          <p:nvPr/>
+        </p:nvSpPr>
+        <p:spPr>
+          <a:xfrm>
+            <a:off x="7562722" y="5948446"/>
+            <a:ext cx="800215" cy="369332"/>
+          </a:xfrm>
+          <a:prstGeom prst="rect">
+            <a:avLst/>
+          </a:prstGeom>
+          <a:noFill/>
+        </p:spPr>
+        <p:txBody>
+          <a:bodyPr wrap="square" rtlCol="0">
+            <a:spAutoFit/>
+          </a:bodyPr>
+          <a:lstStyle/>
+          <a:p>
+            <a:r>
+              <a:rPr lang="en-US" altLang="zh-TW" dirty="0">
+                <a:solidFill>
+                  <a:schemeClr val="accent1">
+                    <a:lumMod val="75000"/>
+                  </a:schemeClr>
+                </a:solidFill>
+              </a:rPr>
+              <a:t>*.csv</a:t>
+            </a:r>
+            <a:endParaRPr lang="zh-TW" altLang="en-US" dirty="0">
+              <a:solidFill>
+                <a:schemeClr val="accent1">
+                  <a:lumMod val="75000"/>
+                </a:schemeClr>
+              </a:solidFill>
+            </a:endParaRPr>
+          </a:p>
+        </p:txBody>
+      </p:sp>
+      <p:cxnSp>
+        <p:nvCxnSpPr>
+          <p:cNvPr id="24" name="接點: 肘形 23">
+            <a:extLst>
+              <a:ext uri="{FF2B5EF4-FFF2-40B4-BE49-F238E27FC236}">
+                <a16:creationId xmlns:a16="http://schemas.microsoft.com/office/drawing/2014/main" id="{64ECF066-091A-4402-B817-9564EFCC9F16}"/>
+              </a:ext>
+            </a:extLst>
+          </p:cNvPr>
+          <p:cNvCxnSpPr>
+            <a:cxnSpLocks/>
+          </p:cNvCxnSpPr>
+          <p:nvPr/>
+        </p:nvCxnSpPr>
+        <p:spPr>
+          <a:xfrm>
+            <a:off x="7315028" y="5306999"/>
+            <a:ext cx="577752" cy="378157"/>
+          </a:xfrm>
+          <a:prstGeom prst="bentConnector2">
+            <a:avLst/>
+          </a:prstGeom>
+          <a:ln w="38100">
+            <a:tailEnd type="triangle"/>
+          </a:ln>
+        </p:spPr>
+        <p:style>
+          <a:lnRef idx="1">
+            <a:schemeClr val="accent1"/>
+          </a:lnRef>
+          <a:fillRef idx="0">
+            <a:schemeClr val="accent1"/>
+          </a:fillRef>
+          <a:effectRef idx="0">
+            <a:schemeClr val="accent1"/>
+          </a:effectRef>
+          <a:fontRef idx="minor">
+            <a:schemeClr val="tx1"/>
+          </a:fontRef>
+        </p:style>
+      </p:cxnSp>
     </p:spTree>
     <p:extLst>
       <p:ext uri="{BB962C8B-B14F-4D97-AF65-F5344CB8AC3E}">
@@ -5581,7 +5683,7 @@
           <a:lstStyle/>
           <a:p>
             <a:r>
-              <a:rPr lang="en-US" altLang="zh-TW" dirty="0" smtClean="0"/>
+              <a:rPr lang="en-US" altLang="zh-TW" dirty="0"/>
               <a:t>QRTest1(App1) Call Rd545cmd1(App2)</a:t>
             </a:r>
             <a:endParaRPr lang="zh-TW" altLang="en-US" dirty="0"/>
@@ -7451,7 +7553,7 @@
           <a:p>
             <a:pPr algn="ctr"/>
             <a:r>
-              <a:rPr lang="en-US" altLang="zh-TW" dirty="0" smtClean="0">
+              <a:rPr lang="en-US" altLang="zh-TW" dirty="0">
                 <a:solidFill>
                   <a:schemeClr val="accent1"/>
                 </a:solidFill>
@@ -7515,7 +7617,7 @@
           <a:p>
             <a:pPr algn="ctr"/>
             <a:r>
-              <a:rPr lang="en-US" altLang="zh-TW" dirty="0" smtClean="0">
+              <a:rPr lang="en-US" altLang="zh-TW" dirty="0">
                 <a:solidFill>
                   <a:schemeClr val="accent1"/>
                 </a:solidFill>
@@ -7579,7 +7681,7 @@
           <a:p>
             <a:pPr algn="ctr"/>
             <a:r>
-              <a:rPr lang="en-US" altLang="zh-TW" dirty="0" smtClean="0">
+              <a:rPr lang="en-US" altLang="zh-TW" dirty="0">
                 <a:solidFill>
                   <a:srgbClr val="FF0000"/>
                 </a:solidFill>
@@ -7643,7 +7745,7 @@
           <a:p>
             <a:pPr algn="ctr"/>
             <a:r>
-              <a:rPr lang="en-US" altLang="zh-TW" dirty="0" smtClean="0">
+              <a:rPr lang="en-US" altLang="zh-TW" dirty="0">
                 <a:solidFill>
                   <a:srgbClr val="FF0000"/>
                 </a:solidFill>
@@ -7709,7 +7811,7 @@
         </p:nvSpPr>
         <p:spPr>
           <a:xfrm rot="2741817">
-            <a:off x="2116658" y="2371883"/>
+            <a:off x="2167458" y="2429033"/>
             <a:ext cx="526228" cy="276999"/>
           </a:xfrm>
           <a:prstGeom prst="rect">
@@ -7724,7 +7826,7 @@
           <a:lstStyle/>
           <a:p>
             <a:r>
-              <a:rPr lang="en-US" altLang="zh-TW" sz="1200" dirty="0" smtClean="0">
+              <a:rPr lang="en-US" altLang="zh-TW" sz="1200" dirty="0">
                 <a:solidFill>
                   <a:srgbClr val="FF0000"/>
                 </a:solidFill>
@@ -7762,12 +7864,8 @@
           <a:lstStyle/>
           <a:p>
             <a:r>
-              <a:rPr lang="en-US" altLang="zh-TW" dirty="0" smtClean="0"/>
-              <a:t>Reference </a:t>
-            </a:r>
-            <a:r>
               <a:rPr lang="en-US" altLang="zh-TW" dirty="0"/>
-              <a:t>from AI</a:t>
+              <a:t>Reference from AI</a:t>
             </a:r>
             <a:endParaRPr lang="zh-TW" altLang="en-US" dirty="0"/>
           </a:p>

</xml_diff>